<commit_message>
added portions to the slide
</commit_message>
<xml_diff>
--- a/Session 1/MM2016Slide1.pptx
+++ b/Session 1/MM2016Slide1.pptx
@@ -6,15 +6,17 @@
   </p:sldMasterIdLst>
   <p:sldIdLst>
     <p:sldId id="256" r:id="rId2"/>
-    <p:sldId id="257" r:id="rId3"/>
-    <p:sldId id="258" r:id="rId4"/>
-    <p:sldId id="259" r:id="rId5"/>
-    <p:sldId id="260" r:id="rId6"/>
-    <p:sldId id="261" r:id="rId7"/>
-    <p:sldId id="262" r:id="rId8"/>
-    <p:sldId id="263" r:id="rId9"/>
-    <p:sldId id="265" r:id="rId10"/>
-    <p:sldId id="264" r:id="rId11"/>
+    <p:sldId id="266" r:id="rId3"/>
+    <p:sldId id="257" r:id="rId4"/>
+    <p:sldId id="258" r:id="rId5"/>
+    <p:sldId id="259" r:id="rId6"/>
+    <p:sldId id="260" r:id="rId7"/>
+    <p:sldId id="261" r:id="rId8"/>
+    <p:sldId id="262" r:id="rId9"/>
+    <p:sldId id="263" r:id="rId10"/>
+    <p:sldId id="265" r:id="rId11"/>
+    <p:sldId id="264" r:id="rId12"/>
+    <p:sldId id="267" r:id="rId13"/>
   </p:sldIdLst>
   <p:sldSz cx="12192000" cy="6858000"/>
   <p:notesSz cx="6858000" cy="9144000"/>
@@ -113,6 +115,11 @@
       </a:defRPr>
     </a:lvl9pPr>
   </p:defaultTextStyle>
+  <p:extLst>
+    <p:ext uri="{EFAFB233-063F-42B5-8137-9DF3F51BA10A}">
+      <p15:sldGuideLst xmlns:p15="http://schemas.microsoft.com/office/powerpoint/2012/main"/>
+    </p:ext>
+  </p:extLst>
 </p:presentation>
 </file>
 
@@ -5803,6 +5810,13 @@
   <p:clrMapOvr>
     <a:masterClrMapping/>
   </p:clrMapOvr>
+  <p:timing>
+    <p:tnLst>
+      <p:par>
+        <p:cTn id="1" dur="indefinite" restart="never" nodeType="tmRoot"/>
+      </p:par>
+    </p:tnLst>
+  </p:timing>
 </p:sld>
 </file>
 
@@ -5840,6 +5854,133 @@
           <a:p>
             <a:r>
               <a:rPr lang="en-US" dirty="0" smtClean="0"/>
+              <a:t>M-Files</a:t>
+            </a:r>
+            <a:endParaRPr lang="en-US" dirty="0"/>
+          </a:p>
+        </p:txBody>
+      </p:sp>
+      <p:sp>
+        <p:nvSpPr>
+          <p:cNvPr id="3" name="Content Placeholder 2"/>
+          <p:cNvSpPr>
+            <a:spLocks noGrp="1"/>
+          </p:cNvSpPr>
+          <p:nvPr>
+            <p:ph idx="1"/>
+          </p:nvPr>
+        </p:nvSpPr>
+        <p:spPr/>
+        <p:txBody>
+          <a:bodyPr/>
+          <a:lstStyle/>
+          <a:p>
+            <a:r>
+              <a:rPr lang="en-US" dirty="0" smtClean="0"/>
+              <a:t>There are 2 kinds of *.m files</a:t>
+            </a:r>
+          </a:p>
+          <a:p>
+            <a:pPr lvl="1"/>
+            <a:r>
+              <a:rPr lang="en-US" dirty="0" smtClean="0"/>
+              <a:t>Functions</a:t>
+            </a:r>
+          </a:p>
+          <a:p>
+            <a:pPr lvl="2"/>
+            <a:r>
+              <a:rPr lang="en-US" dirty="0" smtClean="0"/>
+              <a:t>Well, you should know what functions are, if not, Google it </a:t>
+            </a:r>
+            <a:r>
+              <a:rPr lang="en-US" dirty="0" smtClean="0">
+                <a:sym typeface="Wingdings" panose="05000000000000000000" pitchFamily="2" charset="2"/>
+              </a:rPr>
+              <a:t></a:t>
+            </a:r>
+          </a:p>
+          <a:p>
+            <a:pPr lvl="2"/>
+            <a:r>
+              <a:rPr lang="en-US" dirty="0" smtClean="0">
+                <a:sym typeface="Wingdings" panose="05000000000000000000" pitchFamily="2" charset="2"/>
+              </a:rPr>
+              <a:t>We will get into more details later</a:t>
+            </a:r>
+            <a:endParaRPr lang="en-US" dirty="0" smtClean="0"/>
+          </a:p>
+          <a:p>
+            <a:pPr lvl="1"/>
+            <a:r>
+              <a:rPr lang="en-US" dirty="0" smtClean="0"/>
+              <a:t>Scripts</a:t>
+            </a:r>
+          </a:p>
+          <a:p>
+            <a:pPr lvl="2"/>
+            <a:r>
+              <a:rPr lang="en-US" dirty="0" smtClean="0"/>
+              <a:t>Scripts are simple MATLAB code that will be run line by line</a:t>
+            </a:r>
+          </a:p>
+          <a:p>
+            <a:pPr lvl="2"/>
+            <a:r>
+              <a:rPr lang="en-US" dirty="0" smtClean="0"/>
+              <a:t>It’s like you would run them line by line in command window</a:t>
+            </a:r>
+            <a:endParaRPr lang="en-US" dirty="0"/>
+          </a:p>
+        </p:txBody>
+      </p:sp>
+    </p:spTree>
+    <p:extLst>
+      <p:ext uri="{BB962C8B-B14F-4D97-AF65-F5344CB8AC3E}">
+        <p14:creationId xmlns:p14="http://schemas.microsoft.com/office/powerpoint/2010/main" val="3952383377"/>
+      </p:ext>
+    </p:extLst>
+  </p:cSld>
+  <p:clrMapOvr>
+    <a:masterClrMapping/>
+  </p:clrMapOvr>
+</p:sld>
+</file>
+
+<file path=ppt/slides/slide11.xml><?xml version="1.0" encoding="utf-8"?>
+<p:sld xmlns:a="http://schemas.openxmlformats.org/drawingml/2006/main" xmlns:r="http://schemas.openxmlformats.org/officeDocument/2006/relationships" xmlns:p="http://schemas.openxmlformats.org/presentationml/2006/main">
+  <p:cSld>
+    <p:spTree>
+      <p:nvGrpSpPr>
+        <p:cNvPr id="1" name=""/>
+        <p:cNvGrpSpPr/>
+        <p:nvPr/>
+      </p:nvGrpSpPr>
+      <p:grpSpPr>
+        <a:xfrm>
+          <a:off x="0" y="0"/>
+          <a:ext cx="0" cy="0"/>
+          <a:chOff x="0" y="0"/>
+          <a:chExt cx="0" cy="0"/>
+        </a:xfrm>
+      </p:grpSpPr>
+      <p:sp>
+        <p:nvSpPr>
+          <p:cNvPr id="2" name="Title 1"/>
+          <p:cNvSpPr>
+            <a:spLocks noGrp="1"/>
+          </p:cNvSpPr>
+          <p:nvPr>
+            <p:ph type="title"/>
+          </p:nvPr>
+        </p:nvSpPr>
+        <p:spPr/>
+        <p:txBody>
+          <a:bodyPr/>
+          <a:lstStyle/>
+          <a:p>
+            <a:r>
+              <a:rPr lang="en-US" dirty="0" smtClean="0"/>
               <a:t>Let’s get to business</a:t>
             </a:r>
             <a:endParaRPr lang="en-US" dirty="0"/>
@@ -5879,6 +6020,117 @@
   <p:clrMapOvr>
     <a:masterClrMapping/>
   </p:clrMapOvr>
+  <p:timing>
+    <p:tnLst>
+      <p:par>
+        <p:cTn id="1" dur="indefinite" restart="never" nodeType="tmRoot"/>
+      </p:par>
+    </p:tnLst>
+  </p:timing>
+</p:sld>
+</file>
+
+<file path=ppt/slides/slide12.xml><?xml version="1.0" encoding="utf-8"?>
+<p:sld xmlns:a="http://schemas.openxmlformats.org/drawingml/2006/main" xmlns:r="http://schemas.openxmlformats.org/officeDocument/2006/relationships" xmlns:p="http://schemas.openxmlformats.org/presentationml/2006/main">
+  <p:cSld>
+    <p:spTree>
+      <p:nvGrpSpPr>
+        <p:cNvPr id="1" name=""/>
+        <p:cNvGrpSpPr/>
+        <p:nvPr/>
+      </p:nvGrpSpPr>
+      <p:grpSpPr>
+        <a:xfrm>
+          <a:off x="0" y="0"/>
+          <a:ext cx="0" cy="0"/>
+          <a:chOff x="0" y="0"/>
+          <a:chExt cx="0" cy="0"/>
+        </a:xfrm>
+      </p:grpSpPr>
+      <p:sp>
+        <p:nvSpPr>
+          <p:cNvPr id="4" name="Title 3"/>
+          <p:cNvSpPr>
+            <a:spLocks noGrp="1"/>
+          </p:cNvSpPr>
+          <p:nvPr>
+            <p:ph type="title"/>
+          </p:nvPr>
+        </p:nvSpPr>
+        <p:spPr>
+          <a:xfrm>
+            <a:off x="1039812" y="1874983"/>
+            <a:ext cx="9905999" cy="2743199"/>
+          </a:xfrm>
+        </p:spPr>
+        <p:txBody>
+          <a:bodyPr/>
+          <a:lstStyle/>
+          <a:p>
+            <a:pPr algn="ctr"/>
+            <a:r>
+              <a:rPr lang="en-US" dirty="0" smtClean="0"/>
+              <a:t>Any Questions?</a:t>
+            </a:r>
+            <a:endParaRPr lang="en-US" dirty="0"/>
+          </a:p>
+        </p:txBody>
+      </p:sp>
+      <p:sp>
+        <p:nvSpPr>
+          <p:cNvPr id="6" name="Text Placeholder 5"/>
+          <p:cNvSpPr>
+            <a:spLocks noGrp="1"/>
+          </p:cNvSpPr>
+          <p:nvPr>
+            <p:ph type="body" sz="quarter" idx="13"/>
+          </p:nvPr>
+        </p:nvSpPr>
+        <p:spPr/>
+        <p:txBody>
+          <a:bodyPr/>
+          <a:lstStyle/>
+          <a:p>
+            <a:endParaRPr lang="en-US"/>
+          </a:p>
+        </p:txBody>
+      </p:sp>
+      <p:sp>
+        <p:nvSpPr>
+          <p:cNvPr id="5" name="Text Placeholder 4"/>
+          <p:cNvSpPr>
+            <a:spLocks noGrp="1"/>
+          </p:cNvSpPr>
+          <p:nvPr>
+            <p:ph type="body" idx="1"/>
+          </p:nvPr>
+        </p:nvSpPr>
+        <p:spPr/>
+        <p:txBody>
+          <a:bodyPr/>
+          <a:lstStyle/>
+          <a:p>
+            <a:endParaRPr lang="en-US"/>
+          </a:p>
+        </p:txBody>
+      </p:sp>
+    </p:spTree>
+    <p:extLst>
+      <p:ext uri="{BB962C8B-B14F-4D97-AF65-F5344CB8AC3E}">
+        <p14:creationId xmlns:p14="http://schemas.microsoft.com/office/powerpoint/2010/main" val="846858038"/>
+      </p:ext>
+    </p:extLst>
+  </p:cSld>
+  <p:clrMapOvr>
+    <a:masterClrMapping/>
+  </p:clrMapOvr>
+  <p:timing>
+    <p:tnLst>
+      <p:par>
+        <p:cTn id="1" dur="indefinite" restart="never" nodeType="tmRoot"/>
+      </p:par>
+    </p:tnLst>
+  </p:timing>
 </p:sld>
 </file>
 
@@ -5901,6 +6153,159 @@
       </p:grpSpPr>
       <p:sp>
         <p:nvSpPr>
+          <p:cNvPr id="3" name="Content Placeholder 2"/>
+          <p:cNvSpPr>
+            <a:spLocks noGrp="1"/>
+          </p:cNvSpPr>
+          <p:nvPr>
+            <p:ph idx="1"/>
+          </p:nvPr>
+        </p:nvSpPr>
+        <p:spPr>
+          <a:xfrm>
+            <a:off x="1141413" y="2096655"/>
+            <a:ext cx="9905998" cy="4881418"/>
+          </a:xfrm>
+        </p:spPr>
+        <p:txBody>
+          <a:bodyPr>
+            <a:normAutofit/>
+          </a:bodyPr>
+          <a:lstStyle/>
+          <a:p>
+            <a:r>
+              <a:rPr lang="en-US" dirty="0" smtClean="0"/>
+              <a:t>Edmodo is for handing out your homework and announcements</a:t>
+            </a:r>
+          </a:p>
+          <a:p>
+            <a:pPr lvl="1"/>
+            <a:r>
+              <a:rPr lang="en-US" dirty="0" smtClean="0"/>
+              <a:t>Group Code: </a:t>
+            </a:r>
+            <a:r>
+              <a:rPr lang="en-US" dirty="0" smtClean="0">
+                <a:effectLst/>
+              </a:rPr>
+              <a:t>a6s3az</a:t>
+            </a:r>
+          </a:p>
+          <a:p>
+            <a:pPr lvl="1"/>
+            <a:r>
+              <a:rPr lang="en-US" dirty="0" smtClean="0">
+                <a:effectLst/>
+              </a:rPr>
+              <a:t>Each homework usually has about 7-10 days</a:t>
+            </a:r>
+          </a:p>
+          <a:p>
+            <a:r>
+              <a:rPr lang="en-US" dirty="0" smtClean="0">
+                <a:effectLst/>
+              </a:rPr>
+              <a:t>I will be in SPRL lab on Mondays, in case you have any questions (3</a:t>
+            </a:r>
+            <a:r>
+              <a:rPr lang="en-US" baseline="30000" dirty="0" smtClean="0">
+                <a:effectLst/>
+              </a:rPr>
+              <a:t>rd</a:t>
+            </a:r>
+            <a:r>
+              <a:rPr lang="en-US" dirty="0" smtClean="0">
+                <a:effectLst/>
+              </a:rPr>
+              <a:t> Floor)</a:t>
+            </a:r>
+          </a:p>
+          <a:p>
+            <a:r>
+              <a:rPr lang="en-US" sz="1800" smtClean="0">
+                <a:solidFill>
+                  <a:srgbClr val="FF0000"/>
+                </a:solidFill>
+                <a:effectLst/>
+              </a:rPr>
+              <a:t>** PLAGIARISM </a:t>
+            </a:r>
+            <a:r>
+              <a:rPr lang="en-US" sz="1800" dirty="0" smtClean="0">
+                <a:solidFill>
+                  <a:srgbClr val="FF0000"/>
+                </a:solidFill>
+                <a:effectLst/>
+              </a:rPr>
+              <a:t>IS “NOT” TOLERATED! (you’re better off not turning in your homework)**</a:t>
+            </a:r>
+          </a:p>
+          <a:p>
+            <a:r>
+              <a:rPr lang="en-US" dirty="0" smtClean="0">
+                <a:effectLst/>
+              </a:rPr>
+              <a:t>About half of your score is the homework that you turn in</a:t>
+            </a:r>
+          </a:p>
+          <a:p>
+            <a:r>
+              <a:rPr lang="en-US" dirty="0" smtClean="0">
+                <a:effectLst/>
+              </a:rPr>
+              <a:t>The rest will be your final course project</a:t>
+            </a:r>
+          </a:p>
+          <a:p>
+            <a:pPr lvl="1"/>
+            <a:r>
+              <a:rPr lang="en-US" dirty="0" smtClean="0">
+                <a:effectLst/>
+              </a:rPr>
+              <a:t>Do something cool, you will enjoy it ;-)</a:t>
+            </a:r>
+          </a:p>
+          <a:p>
+            <a:pPr lvl="1"/>
+            <a:r>
+              <a:rPr lang="en-US" dirty="0" smtClean="0">
+                <a:effectLst/>
+              </a:rPr>
+              <a:t>Start thinking about it</a:t>
+            </a:r>
+          </a:p>
+          <a:p>
+            <a:pPr lvl="1"/>
+            <a:r>
+              <a:rPr lang="en-US" dirty="0" smtClean="0">
+                <a:effectLst/>
+              </a:rPr>
+              <a:t>Try new fields in computer vision / image processing / audio processing / …</a:t>
+            </a:r>
+          </a:p>
+          <a:p>
+            <a:pPr lvl="1"/>
+            <a:r>
+              <a:rPr lang="en-US" dirty="0" smtClean="0">
+                <a:effectLst/>
+              </a:rPr>
+              <a:t>It takes more than a couple of days to learn using MATLAB!!!</a:t>
+            </a:r>
+          </a:p>
+          <a:p>
+            <a:pPr lvl="1"/>
+            <a:endParaRPr lang="en-US" dirty="0" smtClean="0">
+              <a:effectLst/>
+            </a:endParaRPr>
+          </a:p>
+          <a:p>
+            <a:pPr lvl="1"/>
+            <a:endParaRPr lang="en-US" dirty="0"/>
+          </a:p>
+        </p:txBody>
+      </p:sp>
+      <p:sp>
+        <p:nvSpPr>
           <p:cNvPr id="2" name="Title 1"/>
           <p:cNvSpPr>
             <a:spLocks noGrp="1"/>
@@ -5916,64 +6321,29 @@
           <a:p>
             <a:r>
               <a:rPr lang="en-US" dirty="0" smtClean="0"/>
-              <a:t>Outline</a:t>
+              <a:t>First things first</a:t>
             </a:r>
             <a:endParaRPr lang="en-US" dirty="0"/>
-          </a:p>
-        </p:txBody>
-      </p:sp>
-      <p:sp>
-        <p:nvSpPr>
-          <p:cNvPr id="3" name="Content Placeholder 2"/>
-          <p:cNvSpPr>
-            <a:spLocks noGrp="1"/>
-          </p:cNvSpPr>
-          <p:nvPr>
-            <p:ph idx="1"/>
-          </p:nvPr>
-        </p:nvSpPr>
-        <p:spPr/>
-        <p:txBody>
-          <a:bodyPr/>
-          <a:lstStyle/>
-          <a:p>
-            <a:r>
-              <a:rPr lang="en-US" dirty="0" smtClean="0"/>
-              <a:t>Introduction to MATLAB</a:t>
-            </a:r>
-          </a:p>
-          <a:p>
-            <a:pPr lvl="1"/>
-            <a:r>
-              <a:rPr lang="en-US" dirty="0" smtClean="0"/>
-              <a:t>Basics and examples</a:t>
-            </a:r>
-          </a:p>
-          <a:p>
-            <a:r>
-              <a:rPr lang="en-US" dirty="0" smtClean="0"/>
-              <a:t>Introduction to Image Representation in MATLAB</a:t>
-            </a:r>
-          </a:p>
-          <a:p>
-            <a:pPr lvl="1"/>
-            <a:r>
-              <a:rPr lang="en-US" dirty="0" smtClean="0"/>
-              <a:t>Basics and examples</a:t>
-            </a:r>
           </a:p>
         </p:txBody>
       </p:sp>
     </p:spTree>
     <p:extLst>
       <p:ext uri="{BB962C8B-B14F-4D97-AF65-F5344CB8AC3E}">
-        <p14:creationId xmlns:p14="http://schemas.microsoft.com/office/powerpoint/2010/main" val="1547866376"/>
+        <p14:creationId xmlns:p14="http://schemas.microsoft.com/office/powerpoint/2010/main" val="3765777648"/>
       </p:ext>
     </p:extLst>
   </p:cSld>
   <p:clrMapOvr>
     <a:masterClrMapping/>
   </p:clrMapOvr>
+  <p:timing>
+    <p:tnLst>
+      <p:par>
+        <p:cTn id="1" dur="indefinite" restart="never" nodeType="tmRoot"/>
+      </p:par>
+    </p:tnLst>
+  </p:timing>
 </p:sld>
 </file>
 
@@ -6011,6 +6381,108 @@
           <a:p>
             <a:r>
               <a:rPr lang="en-US" dirty="0" smtClean="0"/>
+              <a:t>Outline</a:t>
+            </a:r>
+            <a:endParaRPr lang="en-US" dirty="0"/>
+          </a:p>
+        </p:txBody>
+      </p:sp>
+      <p:sp>
+        <p:nvSpPr>
+          <p:cNvPr id="3" name="Content Placeholder 2"/>
+          <p:cNvSpPr>
+            <a:spLocks noGrp="1"/>
+          </p:cNvSpPr>
+          <p:nvPr>
+            <p:ph idx="1"/>
+          </p:nvPr>
+        </p:nvSpPr>
+        <p:spPr/>
+        <p:txBody>
+          <a:bodyPr/>
+          <a:lstStyle/>
+          <a:p>
+            <a:r>
+              <a:rPr lang="en-US" dirty="0" smtClean="0"/>
+              <a:t>Introduction to MATLAB</a:t>
+            </a:r>
+          </a:p>
+          <a:p>
+            <a:pPr lvl="1"/>
+            <a:r>
+              <a:rPr lang="en-US" dirty="0" smtClean="0"/>
+              <a:t>Basics and examples</a:t>
+            </a:r>
+          </a:p>
+          <a:p>
+            <a:r>
+              <a:rPr lang="en-US" dirty="0" smtClean="0"/>
+              <a:t>Introduction to Image Representation in MATLAB</a:t>
+            </a:r>
+          </a:p>
+          <a:p>
+            <a:pPr lvl="1"/>
+            <a:r>
+              <a:rPr lang="en-US" dirty="0" smtClean="0"/>
+              <a:t>Basics and examples</a:t>
+            </a:r>
+          </a:p>
+        </p:txBody>
+      </p:sp>
+    </p:spTree>
+    <p:extLst>
+      <p:ext uri="{BB962C8B-B14F-4D97-AF65-F5344CB8AC3E}">
+        <p14:creationId xmlns:p14="http://schemas.microsoft.com/office/powerpoint/2010/main" val="1547866376"/>
+      </p:ext>
+    </p:extLst>
+  </p:cSld>
+  <p:clrMapOvr>
+    <a:masterClrMapping/>
+  </p:clrMapOvr>
+  <p:timing>
+    <p:tnLst>
+      <p:par>
+        <p:cTn id="1" dur="indefinite" restart="never" nodeType="tmRoot"/>
+      </p:par>
+    </p:tnLst>
+  </p:timing>
+</p:sld>
+</file>
+
+<file path=ppt/slides/slide4.xml><?xml version="1.0" encoding="utf-8"?>
+<p:sld xmlns:a="http://schemas.openxmlformats.org/drawingml/2006/main" xmlns:r="http://schemas.openxmlformats.org/officeDocument/2006/relationships" xmlns:p="http://schemas.openxmlformats.org/presentationml/2006/main">
+  <p:cSld>
+    <p:spTree>
+      <p:nvGrpSpPr>
+        <p:cNvPr id="1" name=""/>
+        <p:cNvGrpSpPr/>
+        <p:nvPr/>
+      </p:nvGrpSpPr>
+      <p:grpSpPr>
+        <a:xfrm>
+          <a:off x="0" y="0"/>
+          <a:ext cx="0" cy="0"/>
+          <a:chOff x="0" y="0"/>
+          <a:chExt cx="0" cy="0"/>
+        </a:xfrm>
+      </p:grpSpPr>
+      <p:sp>
+        <p:nvSpPr>
+          <p:cNvPr id="2" name="Title 1"/>
+          <p:cNvSpPr>
+            <a:spLocks noGrp="1"/>
+          </p:cNvSpPr>
+          <p:nvPr>
+            <p:ph type="title"/>
+          </p:nvPr>
+        </p:nvSpPr>
+        <p:spPr/>
+        <p:txBody>
+          <a:bodyPr/>
+          <a:lstStyle/>
+          <a:p>
+            <a:r>
+              <a:rPr lang="en-US" dirty="0" smtClean="0"/>
               <a:t>Why MATLAB?</a:t>
             </a:r>
             <a:endParaRPr lang="en-US" dirty="0"/>
@@ -6030,7 +6502,7 @@
         <p:spPr/>
         <p:txBody>
           <a:bodyPr>
-            <a:normAutofit lnSpcReduction="10000"/>
+            <a:normAutofit fontScale="92500" lnSpcReduction="20000"/>
           </a:bodyPr>
           <a:lstStyle/>
           <a:p>
@@ -6072,8 +6544,24 @@
           <a:p>
             <a:r>
               <a:rPr lang="en-US" dirty="0" smtClean="0"/>
-              <a:t>A de facto standard framework for academic advancements</a:t>
-            </a:r>
+              <a:t>A de facto standard framework for academic </a:t>
+            </a:r>
+            <a:r>
+              <a:rPr lang="en-US" dirty="0" smtClean="0"/>
+              <a:t>advancements</a:t>
+            </a:r>
+          </a:p>
+          <a:p>
+            <a:pPr lvl="1"/>
+            <a:r>
+              <a:rPr lang="en-US" dirty="0" smtClean="0"/>
+              <a:t>Except for its competitor in computer vision: </a:t>
+            </a:r>
+            <a:r>
+              <a:rPr lang="en-US" dirty="0" err="1" smtClean="0"/>
+              <a:t>OpenCV</a:t>
+            </a:r>
+            <a:endParaRPr lang="en-US" dirty="0" smtClean="0"/>
           </a:p>
           <a:p>
             <a:endParaRPr lang="en-US" dirty="0"/>
@@ -6093,7 +6581,7 @@
 </p:sld>
 </file>
 
-<file path=ppt/slides/slide4.xml><?xml version="1.0" encoding="utf-8"?>
+<file path=ppt/slides/slide5.xml><?xml version="1.0" encoding="utf-8"?>
 <p:sld xmlns:a="http://schemas.openxmlformats.org/drawingml/2006/main" xmlns:r="http://schemas.openxmlformats.org/officeDocument/2006/relationships" xmlns:p="http://schemas.openxmlformats.org/presentationml/2006/main">
   <p:cSld>
     <p:spTree>
@@ -6171,7 +6659,7 @@
 </p:sld>
 </file>
 
-<file path=ppt/slides/slide5.xml><?xml version="1.0" encoding="utf-8"?>
+<file path=ppt/slides/slide6.xml><?xml version="1.0" encoding="utf-8"?>
 <p:sld xmlns:a="http://schemas.openxmlformats.org/drawingml/2006/main" xmlns:r="http://schemas.openxmlformats.org/officeDocument/2006/relationships" xmlns:p="http://schemas.openxmlformats.org/presentationml/2006/main">
   <p:cSld>
     <p:spTree>
@@ -6249,7 +6737,7 @@
 </p:sld>
 </file>
 
-<file path=ppt/slides/slide6.xml><?xml version="1.0" encoding="utf-8"?>
+<file path=ppt/slides/slide7.xml><?xml version="1.0" encoding="utf-8"?>
 <p:sld xmlns:a="http://schemas.openxmlformats.org/drawingml/2006/main" xmlns:r="http://schemas.openxmlformats.org/officeDocument/2006/relationships" xmlns:p="http://schemas.openxmlformats.org/presentationml/2006/main">
   <p:cSld>
     <p:spTree>
@@ -6454,167 +6942,6 @@
 </p:sld>
 </file>
 
-<file path=ppt/slides/slide7.xml><?xml version="1.0" encoding="utf-8"?>
-<p:sld xmlns:a="http://schemas.openxmlformats.org/drawingml/2006/main" xmlns:r="http://schemas.openxmlformats.org/officeDocument/2006/relationships" xmlns:p="http://schemas.openxmlformats.org/presentationml/2006/main">
-  <p:cSld>
-    <p:spTree>
-      <p:nvGrpSpPr>
-        <p:cNvPr id="1" name=""/>
-        <p:cNvGrpSpPr/>
-        <p:nvPr/>
-      </p:nvGrpSpPr>
-      <p:grpSpPr>
-        <a:xfrm>
-          <a:off x="0" y="0"/>
-          <a:ext cx="0" cy="0"/>
-          <a:chOff x="0" y="0"/>
-          <a:chExt cx="0" cy="0"/>
-        </a:xfrm>
-      </p:grpSpPr>
-      <p:sp>
-        <p:nvSpPr>
-          <p:cNvPr id="2" name="Title 1"/>
-          <p:cNvSpPr>
-            <a:spLocks noGrp="1"/>
-          </p:cNvSpPr>
-          <p:nvPr>
-            <p:ph type="title"/>
-          </p:nvPr>
-        </p:nvSpPr>
-        <p:spPr/>
-        <p:txBody>
-          <a:bodyPr/>
-          <a:lstStyle/>
-          <a:p>
-            <a:r>
-              <a:rPr lang="en-US" dirty="0" smtClean="0"/>
-              <a:t>MATLAB Basics</a:t>
-            </a:r>
-            <a:endParaRPr lang="en-US" dirty="0"/>
-          </a:p>
-        </p:txBody>
-      </p:sp>
-      <p:sp>
-        <p:nvSpPr>
-          <p:cNvPr id="3" name="Content Placeholder 2"/>
-          <p:cNvSpPr>
-            <a:spLocks noGrp="1"/>
-          </p:cNvSpPr>
-          <p:nvPr>
-            <p:ph idx="1"/>
-          </p:nvPr>
-        </p:nvSpPr>
-        <p:spPr>
-          <a:xfrm>
-            <a:off x="1141413" y="1948873"/>
-            <a:ext cx="9905998" cy="4442691"/>
-          </a:xfrm>
-        </p:spPr>
-        <p:txBody>
-          <a:bodyPr>
-            <a:normAutofit/>
-          </a:bodyPr>
-          <a:lstStyle/>
-          <a:p>
-            <a:r>
-              <a:rPr lang="en-US" dirty="0" smtClean="0"/>
-              <a:t>Main </a:t>
-            </a:r>
-            <a:r>
-              <a:rPr lang="en-US" dirty="0" err="1" smtClean="0"/>
-              <a:t>matlab</a:t>
-            </a:r>
-            <a:r>
-              <a:rPr lang="en-US" dirty="0" smtClean="0"/>
-              <a:t> variable type: Matrix</a:t>
-            </a:r>
-          </a:p>
-          <a:p>
-            <a:r>
-              <a:rPr lang="en-US" dirty="0" smtClean="0"/>
-              <a:t>Creating matrices:</a:t>
-            </a:r>
-          </a:p>
-          <a:p>
-            <a:pPr lvl="1"/>
-            <a:r>
-              <a:rPr lang="en-US" dirty="0" smtClean="0"/>
-              <a:t>A = [1 2 3; 4 5 6; 7 8 9]</a:t>
-            </a:r>
-          </a:p>
-          <a:p>
-            <a:pPr lvl="1"/>
-            <a:r>
-              <a:rPr lang="en-US" dirty="0" smtClean="0"/>
-              <a:t>Special Matrices: zeros, ones, rand, </a:t>
-            </a:r>
-            <a:r>
-              <a:rPr lang="en-US" dirty="0" err="1" smtClean="0"/>
-              <a:t>randn</a:t>
-            </a:r>
-            <a:r>
-              <a:rPr lang="en-US" dirty="0" smtClean="0"/>
-              <a:t>, eye</a:t>
-            </a:r>
-          </a:p>
-          <a:p>
-            <a:pPr lvl="1"/>
-            <a:r>
-              <a:rPr lang="en-US" dirty="0" smtClean="0"/>
-              <a:t>Finding size of matrix: size(A) = [3 3]</a:t>
-            </a:r>
-          </a:p>
-          <a:p>
-            <a:pPr lvl="1"/>
-            <a:r>
-              <a:rPr lang="en-US" dirty="0" smtClean="0"/>
-              <a:t>Sum(A), sum(A, 2), sum(sum(A))</a:t>
-            </a:r>
-          </a:p>
-          <a:p>
-            <a:pPr lvl="1"/>
-            <a:r>
-              <a:rPr lang="en-US" dirty="0" smtClean="0"/>
-              <a:t>CODE</a:t>
-            </a:r>
-          </a:p>
-          <a:p>
-            <a:r>
-              <a:rPr lang="en-US" dirty="0" smtClean="0"/>
-              <a:t>Finding something in a </a:t>
-            </a:r>
-            <a:r>
-              <a:rPr lang="en-US" dirty="0" err="1" smtClean="0"/>
-              <a:t>matix</a:t>
-            </a:r>
-            <a:r>
-              <a:rPr lang="en-US" dirty="0" smtClean="0"/>
-              <a:t>:</a:t>
-            </a:r>
-          </a:p>
-          <a:p>
-            <a:pPr lvl="1"/>
-            <a:r>
-              <a:rPr lang="en-US" dirty="0" smtClean="0"/>
-              <a:t>Find(A &lt; 4)</a:t>
-            </a:r>
-            <a:endParaRPr lang="en-US" dirty="0"/>
-          </a:p>
-        </p:txBody>
-      </p:sp>
-    </p:spTree>
-    <p:extLst>
-      <p:ext uri="{BB962C8B-B14F-4D97-AF65-F5344CB8AC3E}">
-        <p14:creationId xmlns:p14="http://schemas.microsoft.com/office/powerpoint/2010/main" val="3165146071"/>
-      </p:ext>
-    </p:extLst>
-  </p:cSld>
-  <p:clrMapOvr>
-    <a:masterClrMapping/>
-  </p:clrMapOvr>
-</p:sld>
-</file>
-
 <file path=ppt/slides/slide8.xml><?xml version="1.0" encoding="utf-8"?>
 <p:sld xmlns:a="http://schemas.openxmlformats.org/drawingml/2006/main" xmlns:r="http://schemas.openxmlformats.org/officeDocument/2006/relationships" xmlns:p="http://schemas.openxmlformats.org/presentationml/2006/main">
   <p:cSld>
@@ -6649,7 +6976,7 @@
           <a:p>
             <a:r>
               <a:rPr lang="en-US" dirty="0" smtClean="0"/>
-              <a:t>Control statements</a:t>
+              <a:t>MATLAB Basics</a:t>
             </a:r>
             <a:endParaRPr lang="en-US" dirty="0"/>
           </a:p>
@@ -6665,65 +6992,99 @@
             <p:ph idx="1"/>
           </p:nvPr>
         </p:nvSpPr>
-        <p:spPr/>
+        <p:spPr>
+          <a:xfrm>
+            <a:off x="1141413" y="1948873"/>
+            <a:ext cx="9905998" cy="4442691"/>
+          </a:xfrm>
+        </p:spPr>
         <p:txBody>
           <a:bodyPr>
-            <a:normAutofit fontScale="85000" lnSpcReduction="10000"/>
+            <a:normAutofit/>
           </a:bodyPr>
           <a:lstStyle/>
           <a:p>
             <a:r>
               <a:rPr lang="en-US" dirty="0" smtClean="0"/>
-              <a:t>If statement</a:t>
-            </a:r>
-          </a:p>
-          <a:p>
+              <a:t>Main </a:t>
+            </a:r>
+            <a:r>
+              <a:rPr lang="en-US" dirty="0" err="1" smtClean="0"/>
+              <a:t>matlab</a:t>
+            </a:r>
             <a:r>
               <a:rPr lang="en-US" dirty="0" smtClean="0"/>
-              <a:t>Switch statement</a:t>
+              <a:t> variable type: Matrix</a:t>
             </a:r>
           </a:p>
           <a:p>
             <a:r>
               <a:rPr lang="en-US" dirty="0" smtClean="0"/>
-              <a:t>For loop</a:t>
-            </a:r>
-          </a:p>
-          <a:p>
+              <a:t>Creating matrices:</a:t>
+            </a:r>
+          </a:p>
+          <a:p>
+            <a:pPr lvl="1"/>
             <a:r>
               <a:rPr lang="en-US" dirty="0" smtClean="0"/>
-              <a:t>While loop</a:t>
+              <a:t>A = [1 2 3; 4 5 6; 7 8 9]</a:t>
             </a:r>
           </a:p>
           <a:p>
             <a:pPr lvl="1"/>
             <a:r>
               <a:rPr lang="en-US" dirty="0" smtClean="0"/>
-              <a:t>Continue</a:t>
+              <a:t>Special Matrices: zeros, ones, rand, </a:t>
+            </a:r>
+            <a:r>
+              <a:rPr lang="en-US" dirty="0" err="1" smtClean="0"/>
+              <a:t>randn</a:t>
+            </a:r>
+            <a:r>
+              <a:rPr lang="en-US" dirty="0" smtClean="0"/>
+              <a:t>, eye</a:t>
             </a:r>
           </a:p>
           <a:p>
             <a:pPr lvl="1"/>
             <a:r>
               <a:rPr lang="en-US" dirty="0" smtClean="0"/>
-              <a:t>Break</a:t>
+              <a:t>Finding size of matrix: size(A) = [3 3]</a:t>
             </a:r>
           </a:p>
           <a:p>
             <a:pPr lvl="1"/>
             <a:r>
               <a:rPr lang="en-US" dirty="0" smtClean="0"/>
-              <a:t>End</a:t>
+              <a:t>Sum(A), sum(A, 2), sum(sum(A))</a:t>
             </a:r>
           </a:p>
           <a:p>
             <a:pPr lvl="1"/>
-            <a:endParaRPr lang="en-US" dirty="0"/>
-          </a:p>
-          <a:p>
             <a:r>
               <a:rPr lang="en-US" dirty="0" smtClean="0"/>
-              <a:t>Whenever in doubt, use MATLAB Help</a:t>
+              <a:t>CODE</a:t>
+            </a:r>
+          </a:p>
+          <a:p>
+            <a:r>
+              <a:rPr lang="en-US" dirty="0" smtClean="0"/>
+              <a:t>Finding something in a </a:t>
+            </a:r>
+            <a:r>
+              <a:rPr lang="en-US" dirty="0" err="1" smtClean="0"/>
+              <a:t>matix</a:t>
+            </a:r>
+            <a:r>
+              <a:rPr lang="en-US" dirty="0" smtClean="0"/>
+              <a:t>:</a:t>
+            </a:r>
+          </a:p>
+          <a:p>
+            <a:pPr lvl="1"/>
+            <a:r>
+              <a:rPr lang="en-US" dirty="0" smtClean="0"/>
+              <a:t>Find(A &lt; 4)</a:t>
             </a:r>
             <a:endParaRPr lang="en-US" dirty="0"/>
           </a:p>
@@ -6732,7 +7093,7 @@
     </p:spTree>
     <p:extLst>
       <p:ext uri="{BB962C8B-B14F-4D97-AF65-F5344CB8AC3E}">
-        <p14:creationId xmlns:p14="http://schemas.microsoft.com/office/powerpoint/2010/main" val="3351582785"/>
+        <p14:creationId xmlns:p14="http://schemas.microsoft.com/office/powerpoint/2010/main" val="3165146071"/>
       </p:ext>
     </p:extLst>
   </p:cSld>
@@ -6776,7 +7137,7 @@
           <a:p>
             <a:r>
               <a:rPr lang="en-US" dirty="0" smtClean="0"/>
-              <a:t>M-Files</a:t>
+              <a:t>Control statements</a:t>
             </a:r>
             <a:endParaRPr lang="en-US" dirty="0"/>
           </a:p>
@@ -6794,63 +7155,63 @@
         </p:nvSpPr>
         <p:spPr/>
         <p:txBody>
-          <a:bodyPr/>
+          <a:bodyPr>
+            <a:normAutofit fontScale="85000" lnSpcReduction="10000"/>
+          </a:bodyPr>
           <a:lstStyle/>
           <a:p>
             <a:r>
               <a:rPr lang="en-US" dirty="0" smtClean="0"/>
-              <a:t>There are 2 kinds of *.m files</a:t>
+              <a:t>If statement</a:t>
+            </a:r>
+          </a:p>
+          <a:p>
+            <a:r>
+              <a:rPr lang="en-US" dirty="0" smtClean="0"/>
+              <a:t>Switch statement</a:t>
+            </a:r>
+          </a:p>
+          <a:p>
+            <a:r>
+              <a:rPr lang="en-US" dirty="0" smtClean="0"/>
+              <a:t>For loop</a:t>
+            </a:r>
+          </a:p>
+          <a:p>
+            <a:r>
+              <a:rPr lang="en-US" dirty="0" smtClean="0"/>
+              <a:t>While loop</a:t>
             </a:r>
           </a:p>
           <a:p>
             <a:pPr lvl="1"/>
             <a:r>
               <a:rPr lang="en-US" dirty="0" smtClean="0"/>
-              <a:t>Functions</a:t>
-            </a:r>
-          </a:p>
-          <a:p>
-            <a:pPr lvl="2"/>
+              <a:t>Continue</a:t>
+            </a:r>
+          </a:p>
+          <a:p>
+            <a:pPr lvl="1"/>
             <a:r>
               <a:rPr lang="en-US" dirty="0" smtClean="0"/>
-              <a:t>Well, you should know what functions are, if not, Google it </a:t>
-            </a:r>
-            <a:r>
-              <a:rPr lang="en-US" dirty="0" smtClean="0">
-                <a:sym typeface="Wingdings" panose="05000000000000000000" pitchFamily="2" charset="2"/>
-              </a:rPr>
-              <a:t></a:t>
-            </a:r>
-          </a:p>
-          <a:p>
-            <a:pPr lvl="2"/>
-            <a:r>
-              <a:rPr lang="en-US" dirty="0" smtClean="0">
-                <a:sym typeface="Wingdings" panose="05000000000000000000" pitchFamily="2" charset="2"/>
-              </a:rPr>
-              <a:t>We will get into more details later</a:t>
-            </a:r>
-            <a:endParaRPr lang="en-US" dirty="0" smtClean="0"/>
+              <a:t>Break</a:t>
+            </a:r>
           </a:p>
           <a:p>
             <a:pPr lvl="1"/>
             <a:r>
               <a:rPr lang="en-US" dirty="0" smtClean="0"/>
-              <a:t>Scripts</a:t>
-            </a:r>
-          </a:p>
-          <a:p>
-            <a:pPr lvl="2"/>
+              <a:t>End</a:t>
+            </a:r>
+          </a:p>
+          <a:p>
+            <a:pPr lvl="1"/>
+            <a:endParaRPr lang="en-US" dirty="0"/>
+          </a:p>
+          <a:p>
             <a:r>
               <a:rPr lang="en-US" dirty="0" smtClean="0"/>
-              <a:t>Scripts are simple MATLAB code that will be run line by line</a:t>
-            </a:r>
-          </a:p>
-          <a:p>
-            <a:pPr lvl="2"/>
-            <a:r>
-              <a:rPr lang="en-US" dirty="0" smtClean="0"/>
-              <a:t>It’s like you would run them line by line in command window</a:t>
+              <a:t>Whenever in doubt, use MATLAB Help</a:t>
             </a:r>
             <a:endParaRPr lang="en-US" dirty="0"/>
           </a:p>
@@ -6859,7 +7220,7 @@
     </p:spTree>
     <p:extLst>
       <p:ext uri="{BB962C8B-B14F-4D97-AF65-F5344CB8AC3E}">
-        <p14:creationId xmlns:p14="http://schemas.microsoft.com/office/powerpoint/2010/main" val="3952383377"/>
+        <p14:creationId xmlns:p14="http://schemas.microsoft.com/office/powerpoint/2010/main" val="3351582785"/>
       </p:ext>
     </p:extLst>
   </p:cSld>

</xml_diff>

<commit_message>
added website and git links
</commit_message>
<xml_diff>
--- a/Session 1/MM2016Slide1.pptx
+++ b/Session 1/MM2016Slide1.pptx
@@ -15,8 +15,8 @@
     <p:sldId id="262" r:id="rId9"/>
     <p:sldId id="263" r:id="rId10"/>
     <p:sldId id="265" r:id="rId11"/>
-    <p:sldId id="264" r:id="rId12"/>
-    <p:sldId id="267" r:id="rId13"/>
+    <p:sldId id="267" r:id="rId12"/>
+    <p:sldId id="264" r:id="rId13"/>
   </p:sldIdLst>
   <p:sldSz cx="12192000" cy="6858000"/>
   <p:notesSz cx="6858000" cy="9144000"/>
@@ -5966,7 +5966,7 @@
       </p:grpSpPr>
       <p:sp>
         <p:nvSpPr>
-          <p:cNvPr id="2" name="Title 1"/>
+          <p:cNvPr id="4" name="Title 3"/>
           <p:cNvSpPr>
             <a:spLocks noGrp="1"/>
           </p:cNvSpPr>
@@ -5974,46 +5974,88 @@
             <p:ph type="title"/>
           </p:nvPr>
         </p:nvSpPr>
+        <p:spPr>
+          <a:xfrm>
+            <a:off x="1039812" y="1874983"/>
+            <a:ext cx="9905999" cy="2743199"/>
+          </a:xfrm>
+        </p:spPr>
+        <p:txBody>
+          <a:bodyPr/>
+          <a:lstStyle/>
+          <a:p>
+            <a:pPr algn="ctr"/>
+            <a:r>
+              <a:rPr lang="en-US" dirty="0" smtClean="0"/>
+              <a:t>Any Questions?</a:t>
+            </a:r>
+            <a:endParaRPr lang="en-US" dirty="0"/>
+          </a:p>
+        </p:txBody>
+      </p:sp>
+      <p:sp>
+        <p:nvSpPr>
+          <p:cNvPr id="6" name="Text Placeholder 5"/>
+          <p:cNvSpPr>
+            <a:spLocks noGrp="1"/>
+          </p:cNvSpPr>
+          <p:nvPr>
+            <p:ph type="body" sz="quarter" idx="13"/>
+          </p:nvPr>
+        </p:nvSpPr>
         <p:spPr/>
         <p:txBody>
           <a:bodyPr/>
           <a:lstStyle/>
           <a:p>
+            <a:endParaRPr lang="en-US"/>
+          </a:p>
+        </p:txBody>
+      </p:sp>
+      <p:sp>
+        <p:nvSpPr>
+          <p:cNvPr id="5" name="Text Placeholder 4"/>
+          <p:cNvSpPr>
+            <a:spLocks noGrp="1"/>
+          </p:cNvSpPr>
+          <p:nvPr>
+            <p:ph type="body" idx="1"/>
+          </p:nvPr>
+        </p:nvSpPr>
+        <p:spPr/>
+        <p:txBody>
+          <a:bodyPr/>
+          <a:lstStyle/>
+          <a:p>
             <a:r>
               <a:rPr lang="en-US" dirty="0" smtClean="0"/>
-              <a:t>Let’s get to business</a:t>
+              <a:t>BTW, we have GIT!</a:t>
+            </a:r>
+          </a:p>
+          <a:p>
+            <a:r>
+              <a:rPr lang="en-US" dirty="0" smtClean="0"/>
+              <a:t>Check my website for downloading MATLAB and getting the GIT link</a:t>
             </a:r>
             <a:endParaRPr lang="en-US" dirty="0"/>
           </a:p>
-        </p:txBody>
-      </p:sp>
-      <p:sp>
-        <p:nvSpPr>
-          <p:cNvPr id="3" name="Content Placeholder 2"/>
-          <p:cNvSpPr>
-            <a:spLocks noGrp="1"/>
-          </p:cNvSpPr>
-          <p:nvPr>
-            <p:ph idx="1"/>
-          </p:nvPr>
-        </p:nvSpPr>
-        <p:spPr/>
-        <p:txBody>
-          <a:bodyPr/>
-          <a:lstStyle/>
-          <a:p>
-            <a:r>
-              <a:rPr lang="en-US" dirty="0" smtClean="0"/>
-              <a:t>Check the MATLAB Code</a:t>
-            </a:r>
-            <a:endParaRPr lang="en-US" dirty="0"/>
+          <a:p>
+            <a:r>
+              <a:rPr lang="en-US"/>
+              <a:t>	</a:t>
+            </a:r>
+            <a:r>
+              <a:rPr lang="en-US" smtClean="0"/>
+              <a:t>www.nmahmoudi.ir/teaching.php</a:t>
+            </a:r>
+            <a:endParaRPr lang="en-US" dirty="0" smtClean="0"/>
           </a:p>
         </p:txBody>
       </p:sp>
     </p:spTree>
     <p:extLst>
       <p:ext uri="{BB962C8B-B14F-4D97-AF65-F5344CB8AC3E}">
-        <p14:creationId xmlns:p14="http://schemas.microsoft.com/office/powerpoint/2010/main" val="3298159699"/>
+        <p14:creationId xmlns:p14="http://schemas.microsoft.com/office/powerpoint/2010/main" val="846858038"/>
       </p:ext>
     </p:extLst>
   </p:cSld>
@@ -6049,7 +6091,7 @@
       </p:grpSpPr>
       <p:sp>
         <p:nvSpPr>
-          <p:cNvPr id="4" name="Title 3"/>
+          <p:cNvPr id="2" name="Title 1"/>
           <p:cNvSpPr>
             <a:spLocks noGrp="1"/>
           </p:cNvSpPr>
@@ -6057,20 +6099,14 @@
             <p:ph type="title"/>
           </p:nvPr>
         </p:nvSpPr>
-        <p:spPr>
-          <a:xfrm>
-            <a:off x="1039812" y="1874983"/>
-            <a:ext cx="9905999" cy="2743199"/>
-          </a:xfrm>
-        </p:spPr>
+        <p:spPr/>
         <p:txBody>
           <a:bodyPr/>
           <a:lstStyle/>
           <a:p>
-            <a:pPr algn="ctr"/>
             <a:r>
               <a:rPr lang="en-US" dirty="0" smtClean="0"/>
-              <a:t>Any Questions?</a:t>
+              <a:t>Let’s get to business</a:t>
             </a:r>
             <a:endParaRPr lang="en-US" dirty="0"/>
           </a:p>
@@ -6078,12 +6114,12 @@
       </p:sp>
       <p:sp>
         <p:nvSpPr>
-          <p:cNvPr id="6" name="Text Placeholder 5"/>
-          <p:cNvSpPr>
-            <a:spLocks noGrp="1"/>
-          </p:cNvSpPr>
-          <p:nvPr>
-            <p:ph type="body" sz="quarter" idx="13"/>
+          <p:cNvPr id="3" name="Content Placeholder 2"/>
+          <p:cNvSpPr>
+            <a:spLocks noGrp="1"/>
+          </p:cNvSpPr>
+          <p:nvPr>
+            <p:ph idx="1"/>
           </p:nvPr>
         </p:nvSpPr>
         <p:spPr/>
@@ -6091,33 +6127,18 @@
           <a:bodyPr/>
           <a:lstStyle/>
           <a:p>
-            <a:endParaRPr lang="en-US"/>
-          </a:p>
-        </p:txBody>
-      </p:sp>
-      <p:sp>
-        <p:nvSpPr>
-          <p:cNvPr id="5" name="Text Placeholder 4"/>
-          <p:cNvSpPr>
-            <a:spLocks noGrp="1"/>
-          </p:cNvSpPr>
-          <p:nvPr>
-            <p:ph type="body" idx="1"/>
-          </p:nvPr>
-        </p:nvSpPr>
-        <p:spPr/>
-        <p:txBody>
-          <a:bodyPr/>
-          <a:lstStyle/>
-          <a:p>
-            <a:endParaRPr lang="en-US"/>
+            <a:r>
+              <a:rPr lang="en-US" dirty="0" smtClean="0"/>
+              <a:t>Check the MATLAB Code</a:t>
+            </a:r>
+            <a:endParaRPr lang="en-US" dirty="0"/>
           </a:p>
         </p:txBody>
       </p:sp>
     </p:spTree>
     <p:extLst>
       <p:ext uri="{BB962C8B-B14F-4D97-AF65-F5344CB8AC3E}">
-        <p14:creationId xmlns:p14="http://schemas.microsoft.com/office/powerpoint/2010/main" val="846858038"/>
+        <p14:creationId xmlns:p14="http://schemas.microsoft.com/office/powerpoint/2010/main" val="3298159699"/>
       </p:ext>
     </p:extLst>
   </p:cSld>
@@ -6222,22 +6243,13 @@
           </a:p>
           <a:p>
             <a:r>
-              <a:rPr lang="en-US" sz="1800" smtClean="0">
+              <a:rPr lang="en-US" sz="1800" dirty="0" smtClean="0">
                 <a:solidFill>
                   <a:srgbClr val="FF0000"/>
                 </a:solidFill>
                 <a:effectLst/>
               </a:rPr>
-              <a:t>** PLAGIARISM </a:t>
-            </a:r>
-            <a:r>
-              <a:rPr lang="en-US" sz="1800" dirty="0" smtClean="0">
-                <a:solidFill>
-                  <a:srgbClr val="FF0000"/>
-                </a:solidFill>
-                <a:effectLst/>
-              </a:rPr>
-              <a:t>IS “NOT” TOLERATED! (you’re better off not turning in your homework)**</a:t>
+              <a:t>** PLAGIARISM IS “NOT” TOLERATED! (you’re better off not turning in your homework)**</a:t>
             </a:r>
           </a:p>
           <a:p>
@@ -6544,11 +6556,7 @@
           <a:p>
             <a:r>
               <a:rPr lang="en-US" dirty="0" smtClean="0"/>
-              <a:t>A de facto standard framework for academic </a:t>
-            </a:r>
-            <a:r>
-              <a:rPr lang="en-US" dirty="0" smtClean="0"/>
-              <a:t>advancements</a:t>
+              <a:t>A de facto standard framework for academic advancements</a:t>
             </a:r>
           </a:p>
           <a:p>

</xml_diff>